<commit_message>
Fixed small bug and update the code document.
</commit_message>
<xml_diff>
--- a/Testing/1_Simple_Flask_Deepseek_ChatBot/doc/designDoc.pptx
+++ b/Testing/1_Simple_Flask_Deepseek_ChatBot/doc/designDoc.pptx
@@ -5,11 +5,12 @@
     <p:sldMasterId id="2147483648" r:id="rId1"/>
   </p:sldMasterIdLst>
   <p:notesMasterIdLst>
-    <p:notesMasterId r:id="rId4"/>
+    <p:notesMasterId r:id="rId5"/>
   </p:notesMasterIdLst>
   <p:sldIdLst>
     <p:sldId id="256" r:id="rId2"/>
     <p:sldId id="257" r:id="rId3"/>
+    <p:sldId id="258" r:id="rId4"/>
   </p:sldIdLst>
   <p:sldSz cx="12192000" cy="6858000"/>
   <p:notesSz cx="6858000" cy="9144000"/>
@@ -108,6 +109,11 @@
       </a:defRPr>
     </a:lvl9pPr>
   </p:defaultTextStyle>
+  <p:extLst>
+    <p:ext uri="{EFAFB233-063F-42B5-8137-9DF3F51BA10A}">
+      <p15:sldGuideLst xmlns:p15="http://schemas.microsoft.com/office/powerpoint/2012/main"/>
+    </p:ext>
+  </p:extLst>
 </p:presentation>
 </file>
 
@@ -193,7 +199,7 @@
           <a:p>
             <a:fld id="{0D211830-83A1-4FBD-820E-CF083550808F}" type="datetimeFigureOut">
               <a:rPr lang="en-SG" smtClean="0"/>
-              <a:t>27/2/2025</a:t>
+              <a:t>28/2/2025</a:t>
             </a:fld>
             <a:endParaRPr lang="en-SG"/>
           </a:p>
@@ -694,7 +700,7 @@
           <a:p>
             <a:fld id="{797BEF44-CABC-466F-A4B8-EAE31349DB43}" type="datetimeFigureOut">
               <a:rPr lang="en-SG" smtClean="0"/>
-              <a:t>27/2/2025</a:t>
+              <a:t>28/2/2025</a:t>
             </a:fld>
             <a:endParaRPr lang="en-SG"/>
           </a:p>
@@ -894,7 +900,7 @@
           <a:p>
             <a:fld id="{797BEF44-CABC-466F-A4B8-EAE31349DB43}" type="datetimeFigureOut">
               <a:rPr lang="en-SG" smtClean="0"/>
-              <a:t>27/2/2025</a:t>
+              <a:t>28/2/2025</a:t>
             </a:fld>
             <a:endParaRPr lang="en-SG"/>
           </a:p>
@@ -1104,7 +1110,7 @@
           <a:p>
             <a:fld id="{797BEF44-CABC-466F-A4B8-EAE31349DB43}" type="datetimeFigureOut">
               <a:rPr lang="en-SG" smtClean="0"/>
-              <a:t>27/2/2025</a:t>
+              <a:t>28/2/2025</a:t>
             </a:fld>
             <a:endParaRPr lang="en-SG"/>
           </a:p>
@@ -1304,7 +1310,7 @@
           <a:p>
             <a:fld id="{797BEF44-CABC-466F-A4B8-EAE31349DB43}" type="datetimeFigureOut">
               <a:rPr lang="en-SG" smtClean="0"/>
-              <a:t>27/2/2025</a:t>
+              <a:t>28/2/2025</a:t>
             </a:fld>
             <a:endParaRPr lang="en-SG"/>
           </a:p>
@@ -1580,7 +1586,7 @@
           <a:p>
             <a:fld id="{797BEF44-CABC-466F-A4B8-EAE31349DB43}" type="datetimeFigureOut">
               <a:rPr lang="en-SG" smtClean="0"/>
-              <a:t>27/2/2025</a:t>
+              <a:t>28/2/2025</a:t>
             </a:fld>
             <a:endParaRPr lang="en-SG"/>
           </a:p>
@@ -1848,7 +1854,7 @@
           <a:p>
             <a:fld id="{797BEF44-CABC-466F-A4B8-EAE31349DB43}" type="datetimeFigureOut">
               <a:rPr lang="en-SG" smtClean="0"/>
-              <a:t>27/2/2025</a:t>
+              <a:t>28/2/2025</a:t>
             </a:fld>
             <a:endParaRPr lang="en-SG"/>
           </a:p>
@@ -2263,7 +2269,7 @@
           <a:p>
             <a:fld id="{797BEF44-CABC-466F-A4B8-EAE31349DB43}" type="datetimeFigureOut">
               <a:rPr lang="en-SG" smtClean="0"/>
-              <a:t>27/2/2025</a:t>
+              <a:t>28/2/2025</a:t>
             </a:fld>
             <a:endParaRPr lang="en-SG"/>
           </a:p>
@@ -2405,7 +2411,7 @@
           <a:p>
             <a:fld id="{797BEF44-CABC-466F-A4B8-EAE31349DB43}" type="datetimeFigureOut">
               <a:rPr lang="en-SG" smtClean="0"/>
-              <a:t>27/2/2025</a:t>
+              <a:t>28/2/2025</a:t>
             </a:fld>
             <a:endParaRPr lang="en-SG"/>
           </a:p>
@@ -2518,7 +2524,7 @@
           <a:p>
             <a:fld id="{797BEF44-CABC-466F-A4B8-EAE31349DB43}" type="datetimeFigureOut">
               <a:rPr lang="en-SG" smtClean="0"/>
-              <a:t>27/2/2025</a:t>
+              <a:t>28/2/2025</a:t>
             </a:fld>
             <a:endParaRPr lang="en-SG"/>
           </a:p>
@@ -2831,7 +2837,7 @@
           <a:p>
             <a:fld id="{797BEF44-CABC-466F-A4B8-EAE31349DB43}" type="datetimeFigureOut">
               <a:rPr lang="en-SG" smtClean="0"/>
-              <a:t>27/2/2025</a:t>
+              <a:t>28/2/2025</a:t>
             </a:fld>
             <a:endParaRPr lang="en-SG"/>
           </a:p>
@@ -3120,7 +3126,7 @@
           <a:p>
             <a:fld id="{797BEF44-CABC-466F-A4B8-EAE31349DB43}" type="datetimeFigureOut">
               <a:rPr lang="en-SG" smtClean="0"/>
-              <a:t>27/2/2025</a:t>
+              <a:t>28/2/2025</a:t>
             </a:fld>
             <a:endParaRPr lang="en-SG"/>
           </a:p>
@@ -3363,7 +3369,7 @@
           <a:p>
             <a:fld id="{797BEF44-CABC-466F-A4B8-EAE31349DB43}" type="datetimeFigureOut">
               <a:rPr lang="en-SG" smtClean="0"/>
-              <a:t>27/2/2025</a:t>
+              <a:t>28/2/2025</a:t>
             </a:fld>
             <a:endParaRPr lang="en-SG"/>
           </a:p>
@@ -6711,6 +6717,2163 @@
     <p:extLst>
       <p:ext uri="{BB962C8B-B14F-4D97-AF65-F5344CB8AC3E}">
         <p14:creationId xmlns:p14="http://schemas.microsoft.com/office/powerpoint/2010/main" val="4045599040"/>
+      </p:ext>
+    </p:extLst>
+  </p:cSld>
+  <p:clrMapOvr>
+    <a:masterClrMapping/>
+  </p:clrMapOvr>
+</p:sld>
+</file>
+
+<file path=ppt/slides/slide3.xml><?xml version="1.0" encoding="utf-8"?>
+<p:sld xmlns:a="http://schemas.openxmlformats.org/drawingml/2006/main" xmlns:r="http://schemas.openxmlformats.org/officeDocument/2006/relationships" xmlns:p="http://schemas.openxmlformats.org/presentationml/2006/main">
+  <p:cSld>
+    <p:spTree>
+      <p:nvGrpSpPr>
+        <p:cNvPr id="1" name=""/>
+        <p:cNvGrpSpPr/>
+        <p:nvPr/>
+      </p:nvGrpSpPr>
+      <p:grpSpPr>
+        <a:xfrm>
+          <a:off x="0" y="0"/>
+          <a:ext cx="0" cy="0"/>
+          <a:chOff x="0" y="0"/>
+          <a:chExt cx="0" cy="0"/>
+        </a:xfrm>
+      </p:grpSpPr>
+      <p:sp>
+        <p:nvSpPr>
+          <p:cNvPr id="4" name="Rectangle 3">
+            <a:extLst>
+              <a:ext uri="{FF2B5EF4-FFF2-40B4-BE49-F238E27FC236}">
+                <a16:creationId xmlns:a16="http://schemas.microsoft.com/office/drawing/2014/main" id="{88D2AD9E-0A78-CBBC-96C5-2A68C1359FFD}"/>
+              </a:ext>
+            </a:extLst>
+          </p:cNvPr>
+          <p:cNvSpPr/>
+          <p:nvPr/>
+        </p:nvSpPr>
+        <p:spPr>
+          <a:xfrm>
+            <a:off x="2422915" y="1775072"/>
+            <a:ext cx="1981904" cy="1058360"/>
+          </a:xfrm>
+          <a:prstGeom prst="rect">
+            <a:avLst/>
+          </a:prstGeom>
+        </p:spPr>
+        <p:style>
+          <a:lnRef idx="2">
+            <a:schemeClr val="accent1">
+              <a:shade val="15000"/>
+            </a:schemeClr>
+          </a:lnRef>
+          <a:fillRef idx="1">
+            <a:schemeClr val="accent1"/>
+          </a:fillRef>
+          <a:effectRef idx="0">
+            <a:schemeClr val="accent1"/>
+          </a:effectRef>
+          <a:fontRef idx="minor">
+            <a:schemeClr val="lt1"/>
+          </a:fontRef>
+        </p:style>
+        <p:txBody>
+          <a:bodyPr rtlCol="0" anchor="ctr"/>
+          <a:lstStyle/>
+          <a:p>
+            <a:pPr algn="ctr"/>
+            <a:endParaRPr lang="en-SG"/>
+          </a:p>
+        </p:txBody>
+      </p:sp>
+      <p:sp>
+        <p:nvSpPr>
+          <p:cNvPr id="5" name="Rectangle 4">
+            <a:extLst>
+              <a:ext uri="{FF2B5EF4-FFF2-40B4-BE49-F238E27FC236}">
+                <a16:creationId xmlns:a16="http://schemas.microsoft.com/office/drawing/2014/main" id="{6E2EDA6D-118B-DE17-8892-879C9D22C5F3}"/>
+              </a:ext>
+            </a:extLst>
+          </p:cNvPr>
+          <p:cNvSpPr/>
+          <p:nvPr/>
+        </p:nvSpPr>
+        <p:spPr>
+          <a:xfrm>
+            <a:off x="2168769" y="1084342"/>
+            <a:ext cx="2473568" cy="1922528"/>
+          </a:xfrm>
+          <a:prstGeom prst="rect">
+            <a:avLst/>
+          </a:prstGeom>
+          <a:noFill/>
+        </p:spPr>
+        <p:style>
+          <a:lnRef idx="2">
+            <a:schemeClr val="accent1">
+              <a:shade val="15000"/>
+            </a:schemeClr>
+          </a:lnRef>
+          <a:fillRef idx="1">
+            <a:schemeClr val="accent1"/>
+          </a:fillRef>
+          <a:effectRef idx="0">
+            <a:schemeClr val="accent1"/>
+          </a:effectRef>
+          <a:fontRef idx="minor">
+            <a:schemeClr val="lt1"/>
+          </a:fontRef>
+        </p:style>
+        <p:txBody>
+          <a:bodyPr rtlCol="0" anchor="ctr"/>
+          <a:lstStyle/>
+          <a:p>
+            <a:pPr algn="ctr"/>
+            <a:endParaRPr lang="en-SG"/>
+          </a:p>
+        </p:txBody>
+      </p:sp>
+      <p:pic>
+        <p:nvPicPr>
+          <p:cNvPr id="6" name="Picture 2" descr="DeepSeek Logo and symbol, meaning ...">
+            <a:extLst>
+              <a:ext uri="{FF2B5EF4-FFF2-40B4-BE49-F238E27FC236}">
+                <a16:creationId xmlns:a16="http://schemas.microsoft.com/office/drawing/2014/main" id="{8BCF2CE1-7B73-5E38-A4ED-2ED1DB4346BF}"/>
+              </a:ext>
+            </a:extLst>
+          </p:cNvPr>
+          <p:cNvPicPr>
+            <a:picLocks noChangeAspect="1" noChangeArrowheads="1"/>
+          </p:cNvPicPr>
+          <p:nvPr/>
+        </p:nvPicPr>
+        <p:blipFill rotWithShape="1">
+          <a:blip r:embed="rId2">
+            <a:extLst>
+              <a:ext uri="{28A0092B-C50C-407E-A947-70E740481C1C}">
+                <a14:useLocalDpi xmlns:a14="http://schemas.microsoft.com/office/drawing/2010/main" val="0"/>
+              </a:ext>
+            </a:extLst>
+          </a:blip>
+          <a:srcRect t="17745" b="19385"/>
+          <a:stretch/>
+        </p:blipFill>
+        <p:spPr bwMode="auto">
+          <a:xfrm>
+            <a:off x="2572257" y="1964645"/>
+            <a:ext cx="1519097" cy="534829"/>
+          </a:xfrm>
+          <a:prstGeom prst="rect">
+            <a:avLst/>
+          </a:prstGeom>
+          <a:noFill/>
+          <a:ln w="19050">
+            <a:solidFill>
+              <a:schemeClr val="tx1"/>
+            </a:solidFill>
+          </a:ln>
+          <a:extLst>
+            <a:ext uri="{909E8E84-426E-40DD-AFC4-6F175D3DCCD1}">
+              <a14:hiddenFill xmlns:a14="http://schemas.microsoft.com/office/drawing/2010/main">
+                <a:solidFill>
+                  <a:srgbClr val="FFFFFF"/>
+                </a:solidFill>
+              </a14:hiddenFill>
+            </a:ext>
+          </a:extLst>
+        </p:spPr>
+      </p:pic>
+      <p:pic>
+        <p:nvPicPr>
+          <p:cNvPr id="7" name="Picture 6" descr="Run DeepSeek-R1 Locally for Free in Just 3 Minutes! - DEV Community">
+            <a:extLst>
+              <a:ext uri="{FF2B5EF4-FFF2-40B4-BE49-F238E27FC236}">
+                <a16:creationId xmlns:a16="http://schemas.microsoft.com/office/drawing/2014/main" id="{ADCC41B0-8A96-849E-217E-EDDB0978ABA4}"/>
+              </a:ext>
+            </a:extLst>
+          </p:cNvPr>
+          <p:cNvPicPr>
+            <a:picLocks noChangeAspect="1" noChangeArrowheads="1"/>
+          </p:cNvPicPr>
+          <p:nvPr/>
+        </p:nvPicPr>
+        <p:blipFill>
+          <a:blip r:embed="rId3">
+            <a:extLst>
+              <a:ext uri="{28A0092B-C50C-407E-A947-70E740481C1C}">
+                <a14:useLocalDpi xmlns:a14="http://schemas.microsoft.com/office/drawing/2010/main" val="0"/>
+              </a:ext>
+            </a:extLst>
+          </a:blip>
+          <a:srcRect/>
+          <a:stretch>
+            <a:fillRect/>
+          </a:stretch>
+        </p:blipFill>
+        <p:spPr bwMode="auto">
+          <a:xfrm>
+            <a:off x="3052023" y="1321706"/>
+            <a:ext cx="1184735" cy="408733"/>
+          </a:xfrm>
+          <a:prstGeom prst="rect">
+            <a:avLst/>
+          </a:prstGeom>
+          <a:noFill/>
+          <a:extLst>
+            <a:ext uri="{909E8E84-426E-40DD-AFC4-6F175D3DCCD1}">
+              <a14:hiddenFill xmlns:a14="http://schemas.microsoft.com/office/drawing/2010/main">
+                <a:solidFill>
+                  <a:srgbClr val="FFFFFF"/>
+                </a:solidFill>
+              </a14:hiddenFill>
+            </a:ext>
+          </a:extLst>
+        </p:spPr>
+      </p:pic>
+      <p:sp>
+        <p:nvSpPr>
+          <p:cNvPr id="8" name="TextBox 7">
+            <a:extLst>
+              <a:ext uri="{FF2B5EF4-FFF2-40B4-BE49-F238E27FC236}">
+                <a16:creationId xmlns:a16="http://schemas.microsoft.com/office/drawing/2014/main" id="{C06C1A31-5D2D-3C29-0498-28A3499B408D}"/>
+              </a:ext>
+            </a:extLst>
+          </p:cNvPr>
+          <p:cNvSpPr txBox="1"/>
+          <p:nvPr/>
+        </p:nvSpPr>
+        <p:spPr>
+          <a:xfrm>
+            <a:off x="2532184" y="2530047"/>
+            <a:ext cx="2056197" cy="338554"/>
+          </a:xfrm>
+          <a:prstGeom prst="rect">
+            <a:avLst/>
+          </a:prstGeom>
+          <a:noFill/>
+        </p:spPr>
+        <p:txBody>
+          <a:bodyPr wrap="square">
+            <a:spAutoFit/>
+          </a:bodyPr>
+          <a:lstStyle/>
+          <a:p>
+            <a:r>
+              <a:rPr lang="en-US" sz="1600" b="1" dirty="0">
+                <a:solidFill>
+                  <a:schemeClr val="bg1"/>
+                </a:solidFill>
+              </a:rPr>
+              <a:t>DeepSeek-R1:1.5B</a:t>
+            </a:r>
+            <a:endParaRPr lang="en-SG" sz="1600" b="1" dirty="0">
+              <a:solidFill>
+                <a:schemeClr val="bg1"/>
+              </a:solidFill>
+            </a:endParaRPr>
+          </a:p>
+        </p:txBody>
+      </p:sp>
+      <p:pic>
+        <p:nvPicPr>
+          <p:cNvPr id="9" name="Picture 8">
+            <a:extLst>
+              <a:ext uri="{FF2B5EF4-FFF2-40B4-BE49-F238E27FC236}">
+                <a16:creationId xmlns:a16="http://schemas.microsoft.com/office/drawing/2014/main" id="{29761426-7B30-C4E0-7AEC-1120241B7AA1}"/>
+              </a:ext>
+            </a:extLst>
+          </p:cNvPr>
+          <p:cNvPicPr>
+            <a:picLocks noChangeAspect="1"/>
+          </p:cNvPicPr>
+          <p:nvPr/>
+        </p:nvPicPr>
+        <p:blipFill>
+          <a:blip r:embed="rId4"/>
+          <a:stretch>
+            <a:fillRect/>
+          </a:stretch>
+        </p:blipFill>
+        <p:spPr>
+          <a:xfrm>
+            <a:off x="2436556" y="1186297"/>
+            <a:ext cx="561512" cy="558025"/>
+          </a:xfrm>
+          <a:prstGeom prst="rect">
+            <a:avLst/>
+          </a:prstGeom>
+        </p:spPr>
+      </p:pic>
+      <p:sp>
+        <p:nvSpPr>
+          <p:cNvPr id="10" name="TextBox 9">
+            <a:extLst>
+              <a:ext uri="{FF2B5EF4-FFF2-40B4-BE49-F238E27FC236}">
+                <a16:creationId xmlns:a16="http://schemas.microsoft.com/office/drawing/2014/main" id="{352598D1-6EA8-D125-1F56-E2179CF44A90}"/>
+              </a:ext>
+            </a:extLst>
+          </p:cNvPr>
+          <p:cNvSpPr txBox="1"/>
+          <p:nvPr/>
+        </p:nvSpPr>
+        <p:spPr>
+          <a:xfrm>
+            <a:off x="3078646" y="1063372"/>
+            <a:ext cx="2234360" cy="338554"/>
+          </a:xfrm>
+          <a:prstGeom prst="rect">
+            <a:avLst/>
+          </a:prstGeom>
+          <a:noFill/>
+        </p:spPr>
+        <p:txBody>
+          <a:bodyPr wrap="square">
+            <a:spAutoFit/>
+          </a:bodyPr>
+          <a:lstStyle/>
+          <a:p>
+            <a:r>
+              <a:rPr lang="en-US" sz="1600" b="1" dirty="0"/>
+              <a:t>GPU Server 01</a:t>
+            </a:r>
+            <a:endParaRPr lang="en-SG" sz="1600" b="1" dirty="0"/>
+          </a:p>
+        </p:txBody>
+      </p:sp>
+      <p:sp>
+        <p:nvSpPr>
+          <p:cNvPr id="11" name="Rectangle 10">
+            <a:extLst>
+              <a:ext uri="{FF2B5EF4-FFF2-40B4-BE49-F238E27FC236}">
+                <a16:creationId xmlns:a16="http://schemas.microsoft.com/office/drawing/2014/main" id="{12262934-CB0B-F2BA-EF8B-0478F8C66761}"/>
+              </a:ext>
+            </a:extLst>
+          </p:cNvPr>
+          <p:cNvSpPr/>
+          <p:nvPr/>
+        </p:nvSpPr>
+        <p:spPr>
+          <a:xfrm>
+            <a:off x="1063038" y="4088873"/>
+            <a:ext cx="1981904" cy="1058360"/>
+          </a:xfrm>
+          <a:prstGeom prst="rect">
+            <a:avLst/>
+          </a:prstGeom>
+        </p:spPr>
+        <p:style>
+          <a:lnRef idx="2">
+            <a:schemeClr val="accent1">
+              <a:shade val="15000"/>
+            </a:schemeClr>
+          </a:lnRef>
+          <a:fillRef idx="1">
+            <a:schemeClr val="accent1"/>
+          </a:fillRef>
+          <a:effectRef idx="0">
+            <a:schemeClr val="accent1"/>
+          </a:effectRef>
+          <a:fontRef idx="minor">
+            <a:schemeClr val="lt1"/>
+          </a:fontRef>
+        </p:style>
+        <p:txBody>
+          <a:bodyPr rtlCol="0" anchor="ctr"/>
+          <a:lstStyle/>
+          <a:p>
+            <a:pPr algn="ctr"/>
+            <a:endParaRPr lang="en-SG"/>
+          </a:p>
+        </p:txBody>
+      </p:sp>
+      <p:sp>
+        <p:nvSpPr>
+          <p:cNvPr id="12" name="Rectangle 11">
+            <a:extLst>
+              <a:ext uri="{FF2B5EF4-FFF2-40B4-BE49-F238E27FC236}">
+                <a16:creationId xmlns:a16="http://schemas.microsoft.com/office/drawing/2014/main" id="{72DD2C30-AA54-DDA9-DC0A-AFECECA290CD}"/>
+              </a:ext>
+            </a:extLst>
+          </p:cNvPr>
+          <p:cNvSpPr/>
+          <p:nvPr/>
+        </p:nvSpPr>
+        <p:spPr>
+          <a:xfrm>
+            <a:off x="808892" y="3398143"/>
+            <a:ext cx="2473568" cy="1922528"/>
+          </a:xfrm>
+          <a:prstGeom prst="rect">
+            <a:avLst/>
+          </a:prstGeom>
+          <a:noFill/>
+        </p:spPr>
+        <p:style>
+          <a:lnRef idx="2">
+            <a:schemeClr val="accent1">
+              <a:shade val="15000"/>
+            </a:schemeClr>
+          </a:lnRef>
+          <a:fillRef idx="1">
+            <a:schemeClr val="accent1"/>
+          </a:fillRef>
+          <a:effectRef idx="0">
+            <a:schemeClr val="accent1"/>
+          </a:effectRef>
+          <a:fontRef idx="minor">
+            <a:schemeClr val="lt1"/>
+          </a:fontRef>
+        </p:style>
+        <p:txBody>
+          <a:bodyPr rtlCol="0" anchor="ctr"/>
+          <a:lstStyle/>
+          <a:p>
+            <a:pPr algn="ctr"/>
+            <a:endParaRPr lang="en-SG"/>
+          </a:p>
+        </p:txBody>
+      </p:sp>
+      <p:pic>
+        <p:nvPicPr>
+          <p:cNvPr id="13" name="Picture 2" descr="DeepSeek Logo and symbol, meaning ...">
+            <a:extLst>
+              <a:ext uri="{FF2B5EF4-FFF2-40B4-BE49-F238E27FC236}">
+                <a16:creationId xmlns:a16="http://schemas.microsoft.com/office/drawing/2014/main" id="{EE9DF5AD-7F02-07BB-BE2E-906BC9676C96}"/>
+              </a:ext>
+            </a:extLst>
+          </p:cNvPr>
+          <p:cNvPicPr>
+            <a:picLocks noChangeAspect="1" noChangeArrowheads="1"/>
+          </p:cNvPicPr>
+          <p:nvPr/>
+        </p:nvPicPr>
+        <p:blipFill rotWithShape="1">
+          <a:blip r:embed="rId2">
+            <a:extLst>
+              <a:ext uri="{28A0092B-C50C-407E-A947-70E740481C1C}">
+                <a14:useLocalDpi xmlns:a14="http://schemas.microsoft.com/office/drawing/2010/main" val="0"/>
+              </a:ext>
+            </a:extLst>
+          </a:blip>
+          <a:srcRect t="17745" b="19385"/>
+          <a:stretch/>
+        </p:blipFill>
+        <p:spPr bwMode="auto">
+          <a:xfrm>
+            <a:off x="1212380" y="4278446"/>
+            <a:ext cx="1519097" cy="534829"/>
+          </a:xfrm>
+          <a:prstGeom prst="rect">
+            <a:avLst/>
+          </a:prstGeom>
+          <a:noFill/>
+          <a:ln w="19050">
+            <a:solidFill>
+              <a:schemeClr val="tx1"/>
+            </a:solidFill>
+          </a:ln>
+          <a:extLst>
+            <a:ext uri="{909E8E84-426E-40DD-AFC4-6F175D3DCCD1}">
+              <a14:hiddenFill xmlns:a14="http://schemas.microsoft.com/office/drawing/2010/main">
+                <a:solidFill>
+                  <a:srgbClr val="FFFFFF"/>
+                </a:solidFill>
+              </a14:hiddenFill>
+            </a:ext>
+          </a:extLst>
+        </p:spPr>
+      </p:pic>
+      <p:pic>
+        <p:nvPicPr>
+          <p:cNvPr id="14" name="Picture 13" descr="Run DeepSeek-R1 Locally for Free in Just 3 Minutes! - DEV Community">
+            <a:extLst>
+              <a:ext uri="{FF2B5EF4-FFF2-40B4-BE49-F238E27FC236}">
+                <a16:creationId xmlns:a16="http://schemas.microsoft.com/office/drawing/2014/main" id="{22D2EE03-1884-9929-8735-5B45430441C9}"/>
+              </a:ext>
+            </a:extLst>
+          </p:cNvPr>
+          <p:cNvPicPr>
+            <a:picLocks noChangeAspect="1" noChangeArrowheads="1"/>
+          </p:cNvPicPr>
+          <p:nvPr/>
+        </p:nvPicPr>
+        <p:blipFill>
+          <a:blip r:embed="rId3">
+            <a:extLst>
+              <a:ext uri="{28A0092B-C50C-407E-A947-70E740481C1C}">
+                <a14:useLocalDpi xmlns:a14="http://schemas.microsoft.com/office/drawing/2010/main" val="0"/>
+              </a:ext>
+            </a:extLst>
+          </a:blip>
+          <a:srcRect/>
+          <a:stretch>
+            <a:fillRect/>
+          </a:stretch>
+        </p:blipFill>
+        <p:spPr bwMode="auto">
+          <a:xfrm>
+            <a:off x="1692146" y="3635507"/>
+            <a:ext cx="1184735" cy="408733"/>
+          </a:xfrm>
+          <a:prstGeom prst="rect">
+            <a:avLst/>
+          </a:prstGeom>
+          <a:noFill/>
+          <a:extLst>
+            <a:ext uri="{909E8E84-426E-40DD-AFC4-6F175D3DCCD1}">
+              <a14:hiddenFill xmlns:a14="http://schemas.microsoft.com/office/drawing/2010/main">
+                <a:solidFill>
+                  <a:srgbClr val="FFFFFF"/>
+                </a:solidFill>
+              </a14:hiddenFill>
+            </a:ext>
+          </a:extLst>
+        </p:spPr>
+      </p:pic>
+      <p:sp>
+        <p:nvSpPr>
+          <p:cNvPr id="15" name="TextBox 14">
+            <a:extLst>
+              <a:ext uri="{FF2B5EF4-FFF2-40B4-BE49-F238E27FC236}">
+                <a16:creationId xmlns:a16="http://schemas.microsoft.com/office/drawing/2014/main" id="{55837B40-1202-7E90-5D3C-AA76F7B6E2B4}"/>
+              </a:ext>
+            </a:extLst>
+          </p:cNvPr>
+          <p:cNvSpPr txBox="1"/>
+          <p:nvPr/>
+        </p:nvSpPr>
+        <p:spPr>
+          <a:xfrm>
+            <a:off x="1172307" y="4843848"/>
+            <a:ext cx="2056197" cy="338554"/>
+          </a:xfrm>
+          <a:prstGeom prst="rect">
+            <a:avLst/>
+          </a:prstGeom>
+          <a:noFill/>
+        </p:spPr>
+        <p:txBody>
+          <a:bodyPr wrap="square">
+            <a:spAutoFit/>
+          </a:bodyPr>
+          <a:lstStyle/>
+          <a:p>
+            <a:r>
+              <a:rPr lang="en-US" sz="1600" b="1" dirty="0">
+                <a:solidFill>
+                  <a:schemeClr val="bg1"/>
+                </a:solidFill>
+              </a:rPr>
+              <a:t>DeepSeek-R1:7B</a:t>
+            </a:r>
+            <a:endParaRPr lang="en-SG" sz="1600" b="1" dirty="0">
+              <a:solidFill>
+                <a:schemeClr val="bg1"/>
+              </a:solidFill>
+            </a:endParaRPr>
+          </a:p>
+        </p:txBody>
+      </p:sp>
+      <p:pic>
+        <p:nvPicPr>
+          <p:cNvPr id="16" name="Picture 15">
+            <a:extLst>
+              <a:ext uri="{FF2B5EF4-FFF2-40B4-BE49-F238E27FC236}">
+                <a16:creationId xmlns:a16="http://schemas.microsoft.com/office/drawing/2014/main" id="{5A264AB0-A5C7-1294-3F9C-FFEABA6DFDCE}"/>
+              </a:ext>
+            </a:extLst>
+          </p:cNvPr>
+          <p:cNvPicPr>
+            <a:picLocks noChangeAspect="1"/>
+          </p:cNvPicPr>
+          <p:nvPr/>
+        </p:nvPicPr>
+        <p:blipFill>
+          <a:blip r:embed="rId4"/>
+          <a:stretch>
+            <a:fillRect/>
+          </a:stretch>
+        </p:blipFill>
+        <p:spPr>
+          <a:xfrm>
+            <a:off x="1076679" y="3500098"/>
+            <a:ext cx="561512" cy="558025"/>
+          </a:xfrm>
+          <a:prstGeom prst="rect">
+            <a:avLst/>
+          </a:prstGeom>
+        </p:spPr>
+      </p:pic>
+      <p:sp>
+        <p:nvSpPr>
+          <p:cNvPr id="17" name="TextBox 16">
+            <a:extLst>
+              <a:ext uri="{FF2B5EF4-FFF2-40B4-BE49-F238E27FC236}">
+                <a16:creationId xmlns:a16="http://schemas.microsoft.com/office/drawing/2014/main" id="{44DAD52D-3C11-E4DA-8F7C-F7D503F3EED7}"/>
+              </a:ext>
+            </a:extLst>
+          </p:cNvPr>
+          <p:cNvSpPr txBox="1"/>
+          <p:nvPr/>
+        </p:nvSpPr>
+        <p:spPr>
+          <a:xfrm>
+            <a:off x="1853461" y="3400897"/>
+            <a:ext cx="2234360" cy="338554"/>
+          </a:xfrm>
+          <a:prstGeom prst="rect">
+            <a:avLst/>
+          </a:prstGeom>
+          <a:noFill/>
+        </p:spPr>
+        <p:txBody>
+          <a:bodyPr wrap="square">
+            <a:spAutoFit/>
+          </a:bodyPr>
+          <a:lstStyle/>
+          <a:p>
+            <a:r>
+              <a:rPr lang="en-US" sz="1600" b="1" dirty="0"/>
+              <a:t>GPU Server 02</a:t>
+            </a:r>
+            <a:endParaRPr lang="en-SG" sz="1600" b="1" dirty="0"/>
+          </a:p>
+        </p:txBody>
+      </p:sp>
+      <p:sp>
+        <p:nvSpPr>
+          <p:cNvPr id="18" name="Rectangle 17">
+            <a:extLst>
+              <a:ext uri="{FF2B5EF4-FFF2-40B4-BE49-F238E27FC236}">
+                <a16:creationId xmlns:a16="http://schemas.microsoft.com/office/drawing/2014/main" id="{00303C1C-6F81-C755-981D-CCD91B87FFD1}"/>
+              </a:ext>
+            </a:extLst>
+          </p:cNvPr>
+          <p:cNvSpPr/>
+          <p:nvPr/>
+        </p:nvSpPr>
+        <p:spPr>
+          <a:xfrm>
+            <a:off x="4322054" y="5086247"/>
+            <a:ext cx="1981904" cy="1058360"/>
+          </a:xfrm>
+          <a:prstGeom prst="rect">
+            <a:avLst/>
+          </a:prstGeom>
+        </p:spPr>
+        <p:style>
+          <a:lnRef idx="2">
+            <a:schemeClr val="accent1">
+              <a:shade val="15000"/>
+            </a:schemeClr>
+          </a:lnRef>
+          <a:fillRef idx="1">
+            <a:schemeClr val="accent1"/>
+          </a:fillRef>
+          <a:effectRef idx="0">
+            <a:schemeClr val="accent1"/>
+          </a:effectRef>
+          <a:fontRef idx="minor">
+            <a:schemeClr val="lt1"/>
+          </a:fontRef>
+        </p:style>
+        <p:txBody>
+          <a:bodyPr rtlCol="0" anchor="ctr"/>
+          <a:lstStyle/>
+          <a:p>
+            <a:pPr algn="ctr"/>
+            <a:endParaRPr lang="en-SG"/>
+          </a:p>
+        </p:txBody>
+      </p:sp>
+      <p:sp>
+        <p:nvSpPr>
+          <p:cNvPr id="19" name="Rectangle 18">
+            <a:extLst>
+              <a:ext uri="{FF2B5EF4-FFF2-40B4-BE49-F238E27FC236}">
+                <a16:creationId xmlns:a16="http://schemas.microsoft.com/office/drawing/2014/main" id="{37E525F2-BF99-BB24-FB8C-3779B96C6C3E}"/>
+              </a:ext>
+            </a:extLst>
+          </p:cNvPr>
+          <p:cNvSpPr/>
+          <p:nvPr/>
+        </p:nvSpPr>
+        <p:spPr>
+          <a:xfrm>
+            <a:off x="3536606" y="4395517"/>
+            <a:ext cx="3004870" cy="1922528"/>
+          </a:xfrm>
+          <a:prstGeom prst="rect">
+            <a:avLst/>
+          </a:prstGeom>
+          <a:noFill/>
+        </p:spPr>
+        <p:style>
+          <a:lnRef idx="2">
+            <a:schemeClr val="accent1">
+              <a:shade val="15000"/>
+            </a:schemeClr>
+          </a:lnRef>
+          <a:fillRef idx="1">
+            <a:schemeClr val="accent1"/>
+          </a:fillRef>
+          <a:effectRef idx="0">
+            <a:schemeClr val="accent1"/>
+          </a:effectRef>
+          <a:fontRef idx="minor">
+            <a:schemeClr val="lt1"/>
+          </a:fontRef>
+        </p:style>
+        <p:txBody>
+          <a:bodyPr rtlCol="0" anchor="ctr"/>
+          <a:lstStyle/>
+          <a:p>
+            <a:pPr algn="ctr"/>
+            <a:endParaRPr lang="en-SG"/>
+          </a:p>
+        </p:txBody>
+      </p:sp>
+      <p:pic>
+        <p:nvPicPr>
+          <p:cNvPr id="20" name="Picture 2" descr="DeepSeek Logo and symbol, meaning ...">
+            <a:extLst>
+              <a:ext uri="{FF2B5EF4-FFF2-40B4-BE49-F238E27FC236}">
+                <a16:creationId xmlns:a16="http://schemas.microsoft.com/office/drawing/2014/main" id="{AD8FB894-55C1-C706-D23C-6F5A440E4D26}"/>
+              </a:ext>
+            </a:extLst>
+          </p:cNvPr>
+          <p:cNvPicPr>
+            <a:picLocks noChangeAspect="1" noChangeArrowheads="1"/>
+          </p:cNvPicPr>
+          <p:nvPr/>
+        </p:nvPicPr>
+        <p:blipFill rotWithShape="1">
+          <a:blip r:embed="rId2">
+            <a:extLst>
+              <a:ext uri="{28A0092B-C50C-407E-A947-70E740481C1C}">
+                <a14:useLocalDpi xmlns:a14="http://schemas.microsoft.com/office/drawing/2010/main" val="0"/>
+              </a:ext>
+            </a:extLst>
+          </a:blip>
+          <a:srcRect t="17745" b="19385"/>
+          <a:stretch/>
+        </p:blipFill>
+        <p:spPr bwMode="auto">
+          <a:xfrm>
+            <a:off x="4471396" y="5275820"/>
+            <a:ext cx="1519097" cy="534829"/>
+          </a:xfrm>
+          <a:prstGeom prst="rect">
+            <a:avLst/>
+          </a:prstGeom>
+          <a:noFill/>
+          <a:ln w="19050">
+            <a:solidFill>
+              <a:schemeClr val="tx1"/>
+            </a:solidFill>
+          </a:ln>
+          <a:extLst>
+            <a:ext uri="{909E8E84-426E-40DD-AFC4-6F175D3DCCD1}">
+              <a14:hiddenFill xmlns:a14="http://schemas.microsoft.com/office/drawing/2010/main">
+                <a:solidFill>
+                  <a:srgbClr val="FFFFFF"/>
+                </a:solidFill>
+              </a14:hiddenFill>
+            </a:ext>
+          </a:extLst>
+        </p:spPr>
+      </p:pic>
+      <p:pic>
+        <p:nvPicPr>
+          <p:cNvPr id="21" name="Picture 20" descr="Run DeepSeek-R1 Locally for Free in Just 3 Minutes! - DEV Community">
+            <a:extLst>
+              <a:ext uri="{FF2B5EF4-FFF2-40B4-BE49-F238E27FC236}">
+                <a16:creationId xmlns:a16="http://schemas.microsoft.com/office/drawing/2014/main" id="{AE84CC19-3340-CD13-CB6D-A83766AFE02A}"/>
+              </a:ext>
+            </a:extLst>
+          </p:cNvPr>
+          <p:cNvPicPr>
+            <a:picLocks noChangeAspect="1" noChangeArrowheads="1"/>
+          </p:cNvPicPr>
+          <p:nvPr/>
+        </p:nvPicPr>
+        <p:blipFill>
+          <a:blip r:embed="rId3">
+            <a:extLst>
+              <a:ext uri="{28A0092B-C50C-407E-A947-70E740481C1C}">
+                <a14:useLocalDpi xmlns:a14="http://schemas.microsoft.com/office/drawing/2010/main" val="0"/>
+              </a:ext>
+            </a:extLst>
+          </a:blip>
+          <a:srcRect/>
+          <a:stretch>
+            <a:fillRect/>
+          </a:stretch>
+        </p:blipFill>
+        <p:spPr bwMode="auto">
+          <a:xfrm>
+            <a:off x="4951162" y="4632881"/>
+            <a:ext cx="1184735" cy="408733"/>
+          </a:xfrm>
+          <a:prstGeom prst="rect">
+            <a:avLst/>
+          </a:prstGeom>
+          <a:noFill/>
+          <a:extLst>
+            <a:ext uri="{909E8E84-426E-40DD-AFC4-6F175D3DCCD1}">
+              <a14:hiddenFill xmlns:a14="http://schemas.microsoft.com/office/drawing/2010/main">
+                <a:solidFill>
+                  <a:srgbClr val="FFFFFF"/>
+                </a:solidFill>
+              </a14:hiddenFill>
+            </a:ext>
+          </a:extLst>
+        </p:spPr>
+      </p:pic>
+      <p:sp>
+        <p:nvSpPr>
+          <p:cNvPr id="22" name="TextBox 21">
+            <a:extLst>
+              <a:ext uri="{FF2B5EF4-FFF2-40B4-BE49-F238E27FC236}">
+                <a16:creationId xmlns:a16="http://schemas.microsoft.com/office/drawing/2014/main" id="{90CCB03A-E50E-9557-8006-787A09DA018E}"/>
+              </a:ext>
+            </a:extLst>
+          </p:cNvPr>
+          <p:cNvSpPr txBox="1"/>
+          <p:nvPr/>
+        </p:nvSpPr>
+        <p:spPr>
+          <a:xfrm>
+            <a:off x="4431323" y="5841222"/>
+            <a:ext cx="2056197" cy="338554"/>
+          </a:xfrm>
+          <a:prstGeom prst="rect">
+            <a:avLst/>
+          </a:prstGeom>
+          <a:noFill/>
+        </p:spPr>
+        <p:txBody>
+          <a:bodyPr wrap="square">
+            <a:spAutoFit/>
+          </a:bodyPr>
+          <a:lstStyle/>
+          <a:p>
+            <a:r>
+              <a:rPr lang="en-US" sz="1600" b="1" dirty="0">
+                <a:solidFill>
+                  <a:schemeClr val="bg1"/>
+                </a:solidFill>
+              </a:rPr>
+              <a:t>DeepSeek-R1:8B</a:t>
+            </a:r>
+            <a:endParaRPr lang="en-SG" sz="1600" b="1" dirty="0">
+              <a:solidFill>
+                <a:schemeClr val="bg1"/>
+              </a:solidFill>
+            </a:endParaRPr>
+          </a:p>
+        </p:txBody>
+      </p:sp>
+      <p:pic>
+        <p:nvPicPr>
+          <p:cNvPr id="23" name="Picture 22">
+            <a:extLst>
+              <a:ext uri="{FF2B5EF4-FFF2-40B4-BE49-F238E27FC236}">
+                <a16:creationId xmlns:a16="http://schemas.microsoft.com/office/drawing/2014/main" id="{3D3112C6-BA99-8A6F-0165-F549F209CE89}"/>
+              </a:ext>
+            </a:extLst>
+          </p:cNvPr>
+          <p:cNvPicPr>
+            <a:picLocks noChangeAspect="1"/>
+          </p:cNvPicPr>
+          <p:nvPr/>
+        </p:nvPicPr>
+        <p:blipFill>
+          <a:blip r:embed="rId4"/>
+          <a:stretch>
+            <a:fillRect/>
+          </a:stretch>
+        </p:blipFill>
+        <p:spPr>
+          <a:xfrm>
+            <a:off x="4335695" y="4497472"/>
+            <a:ext cx="561512" cy="558025"/>
+          </a:xfrm>
+          <a:prstGeom prst="rect">
+            <a:avLst/>
+          </a:prstGeom>
+        </p:spPr>
+      </p:pic>
+      <p:sp>
+        <p:nvSpPr>
+          <p:cNvPr id="24" name="TextBox 23">
+            <a:extLst>
+              <a:ext uri="{FF2B5EF4-FFF2-40B4-BE49-F238E27FC236}">
+                <a16:creationId xmlns:a16="http://schemas.microsoft.com/office/drawing/2014/main" id="{0A78F68E-81BE-EA95-59BE-6585EFCA6CE3}"/>
+              </a:ext>
+            </a:extLst>
+          </p:cNvPr>
+          <p:cNvSpPr txBox="1"/>
+          <p:nvPr/>
+        </p:nvSpPr>
+        <p:spPr>
+          <a:xfrm>
+            <a:off x="4951162" y="4388565"/>
+            <a:ext cx="2234360" cy="338554"/>
+          </a:xfrm>
+          <a:prstGeom prst="rect">
+            <a:avLst/>
+          </a:prstGeom>
+          <a:noFill/>
+        </p:spPr>
+        <p:txBody>
+          <a:bodyPr wrap="square">
+            <a:spAutoFit/>
+          </a:bodyPr>
+          <a:lstStyle/>
+          <a:p>
+            <a:r>
+              <a:rPr lang="en-US" sz="1600" b="1" dirty="0"/>
+              <a:t>GPU Server 03</a:t>
+            </a:r>
+            <a:endParaRPr lang="en-SG" sz="1600" b="1" dirty="0"/>
+          </a:p>
+        </p:txBody>
+      </p:sp>
+      <p:sp>
+        <p:nvSpPr>
+          <p:cNvPr id="25" name="Cylinder 24">
+            <a:extLst>
+              <a:ext uri="{FF2B5EF4-FFF2-40B4-BE49-F238E27FC236}">
+                <a16:creationId xmlns:a16="http://schemas.microsoft.com/office/drawing/2014/main" id="{CC382E46-2A30-580B-F4A6-A8D41A56AA1F}"/>
+              </a:ext>
+            </a:extLst>
+          </p:cNvPr>
+          <p:cNvSpPr/>
+          <p:nvPr/>
+        </p:nvSpPr>
+        <p:spPr>
+          <a:xfrm>
+            <a:off x="3727938" y="5182402"/>
+            <a:ext cx="410554" cy="497838"/>
+          </a:xfrm>
+          <a:prstGeom prst="can">
+            <a:avLst/>
+          </a:prstGeom>
+        </p:spPr>
+        <p:style>
+          <a:lnRef idx="2">
+            <a:schemeClr val="accent6">
+              <a:shade val="15000"/>
+            </a:schemeClr>
+          </a:lnRef>
+          <a:fillRef idx="1">
+            <a:schemeClr val="accent6"/>
+          </a:fillRef>
+          <a:effectRef idx="0">
+            <a:schemeClr val="accent6"/>
+          </a:effectRef>
+          <a:fontRef idx="minor">
+            <a:schemeClr val="lt1"/>
+          </a:fontRef>
+        </p:style>
+        <p:txBody>
+          <a:bodyPr rtlCol="0" anchor="ctr"/>
+          <a:lstStyle/>
+          <a:p>
+            <a:pPr algn="ctr"/>
+            <a:endParaRPr lang="en-SG"/>
+          </a:p>
+        </p:txBody>
+      </p:sp>
+      <p:cxnSp>
+        <p:nvCxnSpPr>
+          <p:cNvPr id="27" name="Connector: Elbow 26">
+            <a:extLst>
+              <a:ext uri="{FF2B5EF4-FFF2-40B4-BE49-F238E27FC236}">
+                <a16:creationId xmlns:a16="http://schemas.microsoft.com/office/drawing/2014/main" id="{827BFB09-9A3A-5E0A-7ABA-38D035028C27}"/>
+              </a:ext>
+            </a:extLst>
+          </p:cNvPr>
+          <p:cNvCxnSpPr>
+            <a:stCxn id="25" idx="3"/>
+          </p:cNvCxnSpPr>
+          <p:nvPr/>
+        </p:nvCxnSpPr>
+        <p:spPr>
+          <a:xfrm rot="16200000" flipH="1">
+            <a:off x="3962505" y="5650949"/>
+            <a:ext cx="330259" cy="388839"/>
+          </a:xfrm>
+          <a:prstGeom prst="bentConnector2">
+            <a:avLst/>
+          </a:prstGeom>
+          <a:ln>
+            <a:tailEnd type="triangle"/>
+          </a:ln>
+        </p:spPr>
+        <p:style>
+          <a:lnRef idx="2">
+            <a:schemeClr val="accent1"/>
+          </a:lnRef>
+          <a:fillRef idx="0">
+            <a:schemeClr val="accent1"/>
+          </a:fillRef>
+          <a:effectRef idx="1">
+            <a:schemeClr val="accent1"/>
+          </a:effectRef>
+          <a:fontRef idx="minor">
+            <a:schemeClr val="tx1"/>
+          </a:fontRef>
+        </p:style>
+      </p:cxnSp>
+      <p:sp>
+        <p:nvSpPr>
+          <p:cNvPr id="28" name="TextBox 27">
+            <a:extLst>
+              <a:ext uri="{FF2B5EF4-FFF2-40B4-BE49-F238E27FC236}">
+                <a16:creationId xmlns:a16="http://schemas.microsoft.com/office/drawing/2014/main" id="{7EBEEE62-F474-EC23-3203-D3FE7F599B4B}"/>
+              </a:ext>
+            </a:extLst>
+          </p:cNvPr>
+          <p:cNvSpPr txBox="1"/>
+          <p:nvPr/>
+        </p:nvSpPr>
+        <p:spPr>
+          <a:xfrm>
+            <a:off x="3468897" y="4599861"/>
+            <a:ext cx="1535722" cy="584775"/>
+          </a:xfrm>
+          <a:prstGeom prst="rect">
+            <a:avLst/>
+          </a:prstGeom>
+          <a:noFill/>
+        </p:spPr>
+        <p:txBody>
+          <a:bodyPr wrap="square">
+            <a:spAutoFit/>
+          </a:bodyPr>
+          <a:lstStyle/>
+          <a:p>
+            <a:r>
+              <a:rPr lang="en-SG" sz="1600" b="1" dirty="0"/>
+              <a:t>RAG </a:t>
+            </a:r>
+          </a:p>
+          <a:p>
+            <a:r>
+              <a:rPr lang="en-SG" sz="1600" b="1" dirty="0"/>
+              <a:t>database</a:t>
+            </a:r>
+          </a:p>
+        </p:txBody>
+      </p:sp>
+      <p:pic>
+        <p:nvPicPr>
+          <p:cNvPr id="29" name="Graphic 28" descr="Web design with solid fill">
+            <a:extLst>
+              <a:ext uri="{FF2B5EF4-FFF2-40B4-BE49-F238E27FC236}">
+                <a16:creationId xmlns:a16="http://schemas.microsoft.com/office/drawing/2014/main" id="{C0697CB7-7093-BD53-1A4B-8E3097C27AEC}"/>
+              </a:ext>
+            </a:extLst>
+          </p:cNvPr>
+          <p:cNvPicPr>
+            <a:picLocks noChangeAspect="1"/>
+          </p:cNvPicPr>
+          <p:nvPr/>
+        </p:nvPicPr>
+        <p:blipFill>
+          <a:blip r:embed="rId5">
+            <a:extLst>
+              <a:ext uri="{96DAC541-7B7A-43D3-8B79-37D633B846F1}">
+                <asvg:svgBlip xmlns:asvg="http://schemas.microsoft.com/office/drawing/2016/SVG/main" r:embed="rId6"/>
+              </a:ext>
+            </a:extLst>
+          </a:blip>
+          <a:stretch>
+            <a:fillRect/>
+          </a:stretch>
+        </p:blipFill>
+        <p:spPr>
+          <a:xfrm>
+            <a:off x="6012746" y="2807485"/>
+            <a:ext cx="853333" cy="853333"/>
+          </a:xfrm>
+          <a:prstGeom prst="rect">
+            <a:avLst/>
+          </a:prstGeom>
+        </p:spPr>
+      </p:pic>
+      <p:sp>
+        <p:nvSpPr>
+          <p:cNvPr id="30" name="Rectangle 29">
+            <a:extLst>
+              <a:ext uri="{FF2B5EF4-FFF2-40B4-BE49-F238E27FC236}">
+                <a16:creationId xmlns:a16="http://schemas.microsoft.com/office/drawing/2014/main" id="{B694441A-0780-7C3E-E795-B5D1846F5189}"/>
+              </a:ext>
+            </a:extLst>
+          </p:cNvPr>
+          <p:cNvSpPr/>
+          <p:nvPr/>
+        </p:nvSpPr>
+        <p:spPr>
+          <a:xfrm>
+            <a:off x="5798781" y="2245686"/>
+            <a:ext cx="1485390" cy="1576586"/>
+          </a:xfrm>
+          <a:prstGeom prst="rect">
+            <a:avLst/>
+          </a:prstGeom>
+          <a:noFill/>
+        </p:spPr>
+        <p:style>
+          <a:lnRef idx="2">
+            <a:schemeClr val="accent1">
+              <a:shade val="15000"/>
+            </a:schemeClr>
+          </a:lnRef>
+          <a:fillRef idx="1">
+            <a:schemeClr val="accent1"/>
+          </a:fillRef>
+          <a:effectRef idx="0">
+            <a:schemeClr val="accent1"/>
+          </a:effectRef>
+          <a:fontRef idx="minor">
+            <a:schemeClr val="lt1"/>
+          </a:fontRef>
+        </p:style>
+        <p:txBody>
+          <a:bodyPr rtlCol="0" anchor="ctr"/>
+          <a:lstStyle/>
+          <a:p>
+            <a:pPr algn="ctr"/>
+            <a:endParaRPr lang="en-SG"/>
+          </a:p>
+        </p:txBody>
+      </p:sp>
+      <p:sp>
+        <p:nvSpPr>
+          <p:cNvPr id="31" name="TextBox 30">
+            <a:extLst>
+              <a:ext uri="{FF2B5EF4-FFF2-40B4-BE49-F238E27FC236}">
+                <a16:creationId xmlns:a16="http://schemas.microsoft.com/office/drawing/2014/main" id="{8290516D-CAC6-63D8-5EC9-7429C2ABEDF4}"/>
+              </a:ext>
+            </a:extLst>
+          </p:cNvPr>
+          <p:cNvSpPr txBox="1"/>
+          <p:nvPr/>
+        </p:nvSpPr>
+        <p:spPr>
+          <a:xfrm>
+            <a:off x="6059223" y="2337696"/>
+            <a:ext cx="1136657" cy="584775"/>
+          </a:xfrm>
+          <a:prstGeom prst="rect">
+            <a:avLst/>
+          </a:prstGeom>
+          <a:noFill/>
+        </p:spPr>
+        <p:txBody>
+          <a:bodyPr wrap="square">
+            <a:spAutoFit/>
+          </a:bodyPr>
+          <a:lstStyle/>
+          <a:p>
+            <a:r>
+              <a:rPr lang="en-US" sz="1600" b="1" dirty="0">
+                <a:solidFill>
+                  <a:schemeClr val="accent3"/>
+                </a:solidFill>
+              </a:rPr>
+              <a:t>Flask Web Host</a:t>
+            </a:r>
+            <a:endParaRPr lang="en-SG" sz="1600" b="1" dirty="0">
+              <a:solidFill>
+                <a:schemeClr val="accent3"/>
+              </a:solidFill>
+            </a:endParaRPr>
+          </a:p>
+        </p:txBody>
+      </p:sp>
+      <p:sp>
+        <p:nvSpPr>
+          <p:cNvPr id="32" name="TextBox 31">
+            <a:extLst>
+              <a:ext uri="{FF2B5EF4-FFF2-40B4-BE49-F238E27FC236}">
+                <a16:creationId xmlns:a16="http://schemas.microsoft.com/office/drawing/2014/main" id="{71375F5F-AF44-CC8B-7752-4C1E86099589}"/>
+              </a:ext>
+            </a:extLst>
+          </p:cNvPr>
+          <p:cNvSpPr txBox="1"/>
+          <p:nvPr/>
+        </p:nvSpPr>
+        <p:spPr>
+          <a:xfrm>
+            <a:off x="5652846" y="1831275"/>
+            <a:ext cx="1675160" cy="338554"/>
+          </a:xfrm>
+          <a:prstGeom prst="rect">
+            <a:avLst/>
+          </a:prstGeom>
+          <a:noFill/>
+        </p:spPr>
+        <p:txBody>
+          <a:bodyPr wrap="square">
+            <a:spAutoFit/>
+          </a:bodyPr>
+          <a:lstStyle/>
+          <a:p>
+            <a:r>
+              <a:rPr lang="en-US" sz="1600" b="1" dirty="0"/>
+              <a:t>Service Server</a:t>
+            </a:r>
+            <a:endParaRPr lang="en-SG" sz="1600" b="1" dirty="0"/>
+          </a:p>
+        </p:txBody>
+      </p:sp>
+      <p:cxnSp>
+        <p:nvCxnSpPr>
+          <p:cNvPr id="34" name="Connector: Elbow 33">
+            <a:extLst>
+              <a:ext uri="{FF2B5EF4-FFF2-40B4-BE49-F238E27FC236}">
+                <a16:creationId xmlns:a16="http://schemas.microsoft.com/office/drawing/2014/main" id="{E030FE8E-C153-6457-9165-035D6C4801FC}"/>
+              </a:ext>
+            </a:extLst>
+          </p:cNvPr>
+          <p:cNvCxnSpPr>
+            <a:cxnSpLocks/>
+            <a:endCxn id="4" idx="3"/>
+          </p:cNvCxnSpPr>
+          <p:nvPr/>
+        </p:nvCxnSpPr>
+        <p:spPr>
+          <a:xfrm rot="10800000">
+            <a:off x="4404819" y="2304253"/>
+            <a:ext cx="1585674" cy="778475"/>
+          </a:xfrm>
+          <a:prstGeom prst="bentConnector3">
+            <a:avLst/>
+          </a:prstGeom>
+          <a:ln>
+            <a:tailEnd type="triangle"/>
+          </a:ln>
+        </p:spPr>
+        <p:style>
+          <a:lnRef idx="2">
+            <a:schemeClr val="accent1"/>
+          </a:lnRef>
+          <a:fillRef idx="0">
+            <a:schemeClr val="accent1"/>
+          </a:fillRef>
+          <a:effectRef idx="1">
+            <a:schemeClr val="accent1"/>
+          </a:effectRef>
+          <a:fontRef idx="minor">
+            <a:schemeClr val="tx1"/>
+          </a:fontRef>
+        </p:style>
+      </p:cxnSp>
+      <p:cxnSp>
+        <p:nvCxnSpPr>
+          <p:cNvPr id="38" name="Connector: Elbow 37">
+            <a:extLst>
+              <a:ext uri="{FF2B5EF4-FFF2-40B4-BE49-F238E27FC236}">
+                <a16:creationId xmlns:a16="http://schemas.microsoft.com/office/drawing/2014/main" id="{DAA62D2C-2C60-CB11-9B4A-CC1D3B52E1BE}"/>
+              </a:ext>
+            </a:extLst>
+          </p:cNvPr>
+          <p:cNvCxnSpPr>
+            <a:cxnSpLocks/>
+            <a:stCxn id="29" idx="1"/>
+          </p:cNvCxnSpPr>
+          <p:nvPr/>
+        </p:nvCxnSpPr>
+        <p:spPr>
+          <a:xfrm rot="10800000" flipV="1">
+            <a:off x="3098902" y="3234151"/>
+            <a:ext cx="2913845" cy="986103"/>
+          </a:xfrm>
+          <a:prstGeom prst="bentConnector3">
+            <a:avLst/>
+          </a:prstGeom>
+          <a:ln>
+            <a:tailEnd type="triangle"/>
+          </a:ln>
+        </p:spPr>
+        <p:style>
+          <a:lnRef idx="2">
+            <a:schemeClr val="accent1"/>
+          </a:lnRef>
+          <a:fillRef idx="0">
+            <a:schemeClr val="accent1"/>
+          </a:fillRef>
+          <a:effectRef idx="1">
+            <a:schemeClr val="accent1"/>
+          </a:effectRef>
+          <a:fontRef idx="minor">
+            <a:schemeClr val="tx1"/>
+          </a:fontRef>
+        </p:style>
+      </p:cxnSp>
+      <p:cxnSp>
+        <p:nvCxnSpPr>
+          <p:cNvPr id="43" name="Connector: Elbow 42">
+            <a:extLst>
+              <a:ext uri="{FF2B5EF4-FFF2-40B4-BE49-F238E27FC236}">
+                <a16:creationId xmlns:a16="http://schemas.microsoft.com/office/drawing/2014/main" id="{672A87D9-7FF2-250F-221E-D91B1DD30432}"/>
+              </a:ext>
+            </a:extLst>
+          </p:cNvPr>
+          <p:cNvCxnSpPr>
+            <a:cxnSpLocks/>
+            <a:stCxn id="29" idx="2"/>
+            <a:endCxn id="18" idx="3"/>
+          </p:cNvCxnSpPr>
+          <p:nvPr/>
+        </p:nvCxnSpPr>
+        <p:spPr>
+          <a:xfrm rot="5400000">
+            <a:off x="5394382" y="4570395"/>
+            <a:ext cx="1954609" cy="135455"/>
+          </a:xfrm>
+          <a:prstGeom prst="bentConnector2">
+            <a:avLst/>
+          </a:prstGeom>
+          <a:ln>
+            <a:tailEnd type="triangle"/>
+          </a:ln>
+        </p:spPr>
+        <p:style>
+          <a:lnRef idx="2">
+            <a:schemeClr val="accent1"/>
+          </a:lnRef>
+          <a:fillRef idx="0">
+            <a:schemeClr val="accent1"/>
+          </a:fillRef>
+          <a:effectRef idx="1">
+            <a:schemeClr val="accent1"/>
+          </a:effectRef>
+          <a:fontRef idx="minor">
+            <a:schemeClr val="tx1"/>
+          </a:fontRef>
+        </p:style>
+      </p:cxnSp>
+      <p:sp>
+        <p:nvSpPr>
+          <p:cNvPr id="48" name="TextBox 47">
+            <a:extLst>
+              <a:ext uri="{FF2B5EF4-FFF2-40B4-BE49-F238E27FC236}">
+                <a16:creationId xmlns:a16="http://schemas.microsoft.com/office/drawing/2014/main" id="{7D515964-8A04-A966-1309-9D396C08CA94}"/>
+              </a:ext>
+            </a:extLst>
+          </p:cNvPr>
+          <p:cNvSpPr txBox="1"/>
+          <p:nvPr/>
+        </p:nvSpPr>
+        <p:spPr>
+          <a:xfrm>
+            <a:off x="4691717" y="1666590"/>
+            <a:ext cx="1093203" cy="584775"/>
+          </a:xfrm>
+          <a:prstGeom prst="rect">
+            <a:avLst/>
+          </a:prstGeom>
+          <a:noFill/>
+        </p:spPr>
+        <p:txBody>
+          <a:bodyPr wrap="square">
+            <a:spAutoFit/>
+          </a:bodyPr>
+          <a:lstStyle/>
+          <a:p>
+            <a:r>
+              <a:rPr lang="en-US" sz="1600" b="1" dirty="0" err="1">
+                <a:solidFill>
+                  <a:schemeClr val="accent1"/>
+                </a:solidFill>
+              </a:rPr>
+              <a:t>Ollama</a:t>
+            </a:r>
+            <a:r>
+              <a:rPr lang="en-US" sz="1600" b="1" dirty="0">
+                <a:solidFill>
+                  <a:schemeClr val="accent1"/>
+                </a:solidFill>
+              </a:rPr>
+              <a:t> API Call</a:t>
+            </a:r>
+            <a:endParaRPr lang="en-SG" sz="1600" b="1" dirty="0">
+              <a:solidFill>
+                <a:schemeClr val="accent1"/>
+              </a:solidFill>
+            </a:endParaRPr>
+          </a:p>
+        </p:txBody>
+      </p:sp>
+      <p:sp>
+        <p:nvSpPr>
+          <p:cNvPr id="49" name="TextBox 48">
+            <a:extLst>
+              <a:ext uri="{FF2B5EF4-FFF2-40B4-BE49-F238E27FC236}">
+                <a16:creationId xmlns:a16="http://schemas.microsoft.com/office/drawing/2014/main" id="{857AD8AB-EDD9-CA6D-8D7C-1C6FEAE56A75}"/>
+              </a:ext>
+            </a:extLst>
+          </p:cNvPr>
+          <p:cNvSpPr txBox="1"/>
+          <p:nvPr/>
+        </p:nvSpPr>
+        <p:spPr>
+          <a:xfrm>
+            <a:off x="3566487" y="3625513"/>
+            <a:ext cx="1093203" cy="584775"/>
+          </a:xfrm>
+          <a:prstGeom prst="rect">
+            <a:avLst/>
+          </a:prstGeom>
+          <a:noFill/>
+        </p:spPr>
+        <p:txBody>
+          <a:bodyPr wrap="square">
+            <a:spAutoFit/>
+          </a:bodyPr>
+          <a:lstStyle/>
+          <a:p>
+            <a:r>
+              <a:rPr lang="en-US" sz="1600" b="1" dirty="0" err="1">
+                <a:solidFill>
+                  <a:schemeClr val="accent1"/>
+                </a:solidFill>
+              </a:rPr>
+              <a:t>Ollama</a:t>
+            </a:r>
+            <a:r>
+              <a:rPr lang="en-US" sz="1600" b="1" dirty="0">
+                <a:solidFill>
+                  <a:schemeClr val="accent1"/>
+                </a:solidFill>
+              </a:rPr>
+              <a:t> API Call</a:t>
+            </a:r>
+            <a:endParaRPr lang="en-SG" sz="1600" b="1" dirty="0">
+              <a:solidFill>
+                <a:schemeClr val="accent1"/>
+              </a:solidFill>
+            </a:endParaRPr>
+          </a:p>
+        </p:txBody>
+      </p:sp>
+      <p:sp>
+        <p:nvSpPr>
+          <p:cNvPr id="50" name="TextBox 49">
+            <a:extLst>
+              <a:ext uri="{FF2B5EF4-FFF2-40B4-BE49-F238E27FC236}">
+                <a16:creationId xmlns:a16="http://schemas.microsoft.com/office/drawing/2014/main" id="{26C1003E-36C2-4185-8D27-CA598E9E34BF}"/>
+              </a:ext>
+            </a:extLst>
+          </p:cNvPr>
+          <p:cNvSpPr txBox="1"/>
+          <p:nvPr/>
+        </p:nvSpPr>
+        <p:spPr>
+          <a:xfrm>
+            <a:off x="5549398" y="3850391"/>
+            <a:ext cx="1093203" cy="584775"/>
+          </a:xfrm>
+          <a:prstGeom prst="rect">
+            <a:avLst/>
+          </a:prstGeom>
+          <a:noFill/>
+        </p:spPr>
+        <p:txBody>
+          <a:bodyPr wrap="square">
+            <a:spAutoFit/>
+          </a:bodyPr>
+          <a:lstStyle/>
+          <a:p>
+            <a:r>
+              <a:rPr lang="en-US" sz="1600" b="1" dirty="0" err="1">
+                <a:solidFill>
+                  <a:schemeClr val="accent1"/>
+                </a:solidFill>
+              </a:rPr>
+              <a:t>Ollama</a:t>
+            </a:r>
+            <a:r>
+              <a:rPr lang="en-US" sz="1600" b="1" dirty="0">
+                <a:solidFill>
+                  <a:schemeClr val="accent1"/>
+                </a:solidFill>
+              </a:rPr>
+              <a:t> API Call</a:t>
+            </a:r>
+            <a:endParaRPr lang="en-SG" sz="1600" b="1" dirty="0">
+              <a:solidFill>
+                <a:schemeClr val="accent1"/>
+              </a:solidFill>
+            </a:endParaRPr>
+          </a:p>
+        </p:txBody>
+      </p:sp>
+      <p:pic>
+        <p:nvPicPr>
+          <p:cNvPr id="51" name="Picture 50" descr="A screenshot of a chat&#10;&#10;AI-generated content may be incorrect.">
+            <a:extLst>
+              <a:ext uri="{FF2B5EF4-FFF2-40B4-BE49-F238E27FC236}">
+                <a16:creationId xmlns:a16="http://schemas.microsoft.com/office/drawing/2014/main" id="{3013080D-414F-8BA3-A560-F90B91B06778}"/>
+              </a:ext>
+            </a:extLst>
+          </p:cNvPr>
+          <p:cNvPicPr>
+            <a:picLocks noChangeAspect="1"/>
+          </p:cNvPicPr>
+          <p:nvPr/>
+        </p:nvPicPr>
+        <p:blipFill>
+          <a:blip r:embed="rId7">
+            <a:extLst>
+              <a:ext uri="{28A0092B-C50C-407E-A947-70E740481C1C}">
+                <a14:useLocalDpi xmlns:a14="http://schemas.microsoft.com/office/drawing/2010/main" val="0"/>
+              </a:ext>
+            </a:extLst>
+          </a:blip>
+          <a:stretch>
+            <a:fillRect/>
+          </a:stretch>
+        </p:blipFill>
+        <p:spPr>
+          <a:xfrm>
+            <a:off x="7757449" y="2513091"/>
+            <a:ext cx="2076785" cy="1057083"/>
+          </a:xfrm>
+          <a:prstGeom prst="rect">
+            <a:avLst/>
+          </a:prstGeom>
+          <a:ln>
+            <a:solidFill>
+              <a:schemeClr val="accent1"/>
+            </a:solidFill>
+          </a:ln>
+        </p:spPr>
+      </p:pic>
+      <p:pic>
+        <p:nvPicPr>
+          <p:cNvPr id="52" name="Graphic 51" descr="User with solid fill">
+            <a:extLst>
+              <a:ext uri="{FF2B5EF4-FFF2-40B4-BE49-F238E27FC236}">
+                <a16:creationId xmlns:a16="http://schemas.microsoft.com/office/drawing/2014/main" id="{76BA11C8-9874-B325-5C84-225E83A15848}"/>
+              </a:ext>
+            </a:extLst>
+          </p:cNvPr>
+          <p:cNvPicPr>
+            <a:picLocks noChangeAspect="1"/>
+          </p:cNvPicPr>
+          <p:nvPr/>
+        </p:nvPicPr>
+        <p:blipFill>
+          <a:blip r:embed="rId8">
+            <a:extLst>
+              <a:ext uri="{96DAC541-7B7A-43D3-8B79-37D633B846F1}">
+                <asvg:svgBlip xmlns:asvg="http://schemas.microsoft.com/office/drawing/2016/SVG/main" r:embed="rId9"/>
+              </a:ext>
+            </a:extLst>
+          </a:blip>
+          <a:stretch>
+            <a:fillRect/>
+          </a:stretch>
+        </p:blipFill>
+        <p:spPr>
+          <a:xfrm>
+            <a:off x="8355383" y="1516583"/>
+            <a:ext cx="683583" cy="683583"/>
+          </a:xfrm>
+          <a:prstGeom prst="rect">
+            <a:avLst/>
+          </a:prstGeom>
+        </p:spPr>
+      </p:pic>
+      <p:cxnSp>
+        <p:nvCxnSpPr>
+          <p:cNvPr id="56" name="Straight Arrow Connector 55">
+            <a:extLst>
+              <a:ext uri="{FF2B5EF4-FFF2-40B4-BE49-F238E27FC236}">
+                <a16:creationId xmlns:a16="http://schemas.microsoft.com/office/drawing/2014/main" id="{8B360D94-5B9E-25DB-29ED-FEAF365B4683}"/>
+              </a:ext>
+            </a:extLst>
+          </p:cNvPr>
+          <p:cNvCxnSpPr>
+            <a:cxnSpLocks/>
+            <a:endCxn id="29" idx="3"/>
+          </p:cNvCxnSpPr>
+          <p:nvPr/>
+        </p:nvCxnSpPr>
+        <p:spPr>
+          <a:xfrm flipH="1">
+            <a:off x="6866079" y="3234152"/>
+            <a:ext cx="857628" cy="0"/>
+          </a:xfrm>
+          <a:prstGeom prst="straightConnector1">
+            <a:avLst/>
+          </a:prstGeom>
+          <a:ln>
+            <a:tailEnd type="triangle"/>
+          </a:ln>
+        </p:spPr>
+        <p:style>
+          <a:lnRef idx="2">
+            <a:schemeClr val="accent1"/>
+          </a:lnRef>
+          <a:fillRef idx="0">
+            <a:schemeClr val="accent1"/>
+          </a:fillRef>
+          <a:effectRef idx="1">
+            <a:schemeClr val="accent1"/>
+          </a:effectRef>
+          <a:fontRef idx="minor">
+            <a:schemeClr val="tx1"/>
+          </a:fontRef>
+        </p:style>
+      </p:cxnSp>
+      <p:cxnSp>
+        <p:nvCxnSpPr>
+          <p:cNvPr id="61" name="Straight Arrow Connector 60">
+            <a:extLst>
+              <a:ext uri="{FF2B5EF4-FFF2-40B4-BE49-F238E27FC236}">
+                <a16:creationId xmlns:a16="http://schemas.microsoft.com/office/drawing/2014/main" id="{06F3241A-A826-3F54-F90E-FB7766D55F55}"/>
+              </a:ext>
+            </a:extLst>
+          </p:cNvPr>
+          <p:cNvCxnSpPr/>
+          <p:nvPr/>
+        </p:nvCxnSpPr>
+        <p:spPr>
+          <a:xfrm>
+            <a:off x="8697174" y="2045606"/>
+            <a:ext cx="0" cy="453868"/>
+          </a:xfrm>
+          <a:prstGeom prst="straightConnector1">
+            <a:avLst/>
+          </a:prstGeom>
+          <a:ln>
+            <a:tailEnd type="triangle"/>
+          </a:ln>
+        </p:spPr>
+        <p:style>
+          <a:lnRef idx="2">
+            <a:schemeClr val="accent1"/>
+          </a:lnRef>
+          <a:fillRef idx="0">
+            <a:schemeClr val="accent1"/>
+          </a:fillRef>
+          <a:effectRef idx="1">
+            <a:schemeClr val="accent1"/>
+          </a:effectRef>
+          <a:fontRef idx="minor">
+            <a:schemeClr val="tx1"/>
+          </a:fontRef>
+        </p:style>
+      </p:cxnSp>
+      <p:sp>
+        <p:nvSpPr>
+          <p:cNvPr id="62" name="TextBox 61">
+            <a:extLst>
+              <a:ext uri="{FF2B5EF4-FFF2-40B4-BE49-F238E27FC236}">
+                <a16:creationId xmlns:a16="http://schemas.microsoft.com/office/drawing/2014/main" id="{AF12DEC5-79EA-39C6-84FB-668CF690B7C9}"/>
+              </a:ext>
+            </a:extLst>
+          </p:cNvPr>
+          <p:cNvSpPr txBox="1"/>
+          <p:nvPr/>
+        </p:nvSpPr>
+        <p:spPr>
+          <a:xfrm>
+            <a:off x="8721968" y="2103263"/>
+            <a:ext cx="1706713" cy="338554"/>
+          </a:xfrm>
+          <a:prstGeom prst="rect">
+            <a:avLst/>
+          </a:prstGeom>
+          <a:noFill/>
+        </p:spPr>
+        <p:txBody>
+          <a:bodyPr wrap="square">
+            <a:spAutoFit/>
+          </a:bodyPr>
+          <a:lstStyle/>
+          <a:p>
+            <a:r>
+              <a:rPr lang="en-SG" sz="1600" b="1" dirty="0">
+                <a:solidFill>
+                  <a:schemeClr val="accent1"/>
+                </a:solidFill>
+              </a:rPr>
+              <a:t>User’s Question</a:t>
+            </a:r>
+          </a:p>
+        </p:txBody>
+      </p:sp>
+      <p:cxnSp>
+        <p:nvCxnSpPr>
+          <p:cNvPr id="63" name="Straight Arrow Connector 62">
+            <a:extLst>
+              <a:ext uri="{FF2B5EF4-FFF2-40B4-BE49-F238E27FC236}">
+                <a16:creationId xmlns:a16="http://schemas.microsoft.com/office/drawing/2014/main" id="{A895523D-0205-0CB9-5202-32288CAABFC4}"/>
+              </a:ext>
+            </a:extLst>
+          </p:cNvPr>
+          <p:cNvCxnSpPr>
+            <a:cxnSpLocks/>
+          </p:cNvCxnSpPr>
+          <p:nvPr/>
+        </p:nvCxnSpPr>
+        <p:spPr>
+          <a:xfrm>
+            <a:off x="6866079" y="3417314"/>
+            <a:ext cx="1185571" cy="0"/>
+          </a:xfrm>
+          <a:prstGeom prst="straightConnector1">
+            <a:avLst/>
+          </a:prstGeom>
+          <a:ln>
+            <a:solidFill>
+              <a:schemeClr val="accent2">
+                <a:lumMod val="75000"/>
+              </a:schemeClr>
+            </a:solidFill>
+            <a:tailEnd type="triangle"/>
+          </a:ln>
+        </p:spPr>
+        <p:style>
+          <a:lnRef idx="2">
+            <a:schemeClr val="accent2"/>
+          </a:lnRef>
+          <a:fillRef idx="0">
+            <a:schemeClr val="accent2"/>
+          </a:fillRef>
+          <a:effectRef idx="1">
+            <a:schemeClr val="accent2"/>
+          </a:effectRef>
+          <a:fontRef idx="minor">
+            <a:schemeClr val="tx1"/>
+          </a:fontRef>
+        </p:style>
+      </p:cxnSp>
+      <p:sp>
+        <p:nvSpPr>
+          <p:cNvPr id="66" name="Speech Bubble: Rectangle 65">
+            <a:extLst>
+              <a:ext uri="{FF2B5EF4-FFF2-40B4-BE49-F238E27FC236}">
+                <a16:creationId xmlns:a16="http://schemas.microsoft.com/office/drawing/2014/main" id="{AC541D94-C6A2-5929-0DE1-C8B2AE166E63}"/>
+              </a:ext>
+            </a:extLst>
+          </p:cNvPr>
+          <p:cNvSpPr/>
+          <p:nvPr/>
+        </p:nvSpPr>
+        <p:spPr>
+          <a:xfrm>
+            <a:off x="7718514" y="3938720"/>
+            <a:ext cx="2234360" cy="2071775"/>
+          </a:xfrm>
+          <a:prstGeom prst="wedgeRectCallout">
+            <a:avLst>
+              <a:gd name="adj1" fmla="val -34823"/>
+              <a:gd name="adj2" fmla="val -73576"/>
+            </a:avLst>
+          </a:prstGeom>
+          <a:solidFill>
+            <a:schemeClr val="bg1"/>
+          </a:solidFill>
+          <a:ln>
+            <a:solidFill>
+              <a:schemeClr val="accent2"/>
+            </a:solidFill>
+          </a:ln>
+        </p:spPr>
+        <p:style>
+          <a:lnRef idx="2">
+            <a:schemeClr val="accent1">
+              <a:shade val="15000"/>
+            </a:schemeClr>
+          </a:lnRef>
+          <a:fillRef idx="1">
+            <a:schemeClr val="accent1"/>
+          </a:fillRef>
+          <a:effectRef idx="0">
+            <a:schemeClr val="accent1"/>
+          </a:effectRef>
+          <a:fontRef idx="minor">
+            <a:schemeClr val="lt1"/>
+          </a:fontRef>
+        </p:style>
+        <p:txBody>
+          <a:bodyPr rtlCol="0" anchor="ctr"/>
+          <a:lstStyle/>
+          <a:p>
+            <a:pPr algn="ctr"/>
+            <a:endParaRPr lang="en-SG" dirty="0"/>
+          </a:p>
+        </p:txBody>
+      </p:sp>
+      <p:sp>
+        <p:nvSpPr>
+          <p:cNvPr id="67" name="TextBox 66">
+            <a:extLst>
+              <a:ext uri="{FF2B5EF4-FFF2-40B4-BE49-F238E27FC236}">
+                <a16:creationId xmlns:a16="http://schemas.microsoft.com/office/drawing/2014/main" id="{6A363B31-80B6-1E98-4117-509612DFC115}"/>
+              </a:ext>
+            </a:extLst>
+          </p:cNvPr>
+          <p:cNvSpPr txBox="1"/>
+          <p:nvPr/>
+        </p:nvSpPr>
+        <p:spPr>
+          <a:xfrm>
+            <a:off x="7800677" y="4076641"/>
+            <a:ext cx="2015474" cy="523220"/>
+          </a:xfrm>
+          <a:prstGeom prst="rect">
+            <a:avLst/>
+          </a:prstGeom>
+          <a:solidFill>
+            <a:schemeClr val="accent1">
+              <a:lumMod val="40000"/>
+              <a:lumOff val="60000"/>
+            </a:schemeClr>
+          </a:solidFill>
+          <a:ln>
+            <a:solidFill>
+              <a:schemeClr val="tx2">
+                <a:lumMod val="25000"/>
+                <a:lumOff val="75000"/>
+              </a:schemeClr>
+            </a:solidFill>
+          </a:ln>
+        </p:spPr>
+        <p:txBody>
+          <a:bodyPr wrap="square">
+            <a:spAutoFit/>
+          </a:bodyPr>
+          <a:lstStyle/>
+          <a:p>
+            <a:r>
+              <a:rPr lang="en-US" sz="1400" b="1" dirty="0">
+                <a:solidFill>
+                  <a:schemeClr val="accent1"/>
+                </a:solidFill>
+              </a:rPr>
+              <a:t>Answer generated by DeepSeek-R1:1.5B</a:t>
+            </a:r>
+            <a:endParaRPr lang="en-SG" sz="1400" b="1" dirty="0">
+              <a:solidFill>
+                <a:schemeClr val="accent1"/>
+              </a:solidFill>
+            </a:endParaRPr>
+          </a:p>
+        </p:txBody>
+      </p:sp>
+      <p:sp>
+        <p:nvSpPr>
+          <p:cNvPr id="68" name="TextBox 67">
+            <a:extLst>
+              <a:ext uri="{FF2B5EF4-FFF2-40B4-BE49-F238E27FC236}">
+                <a16:creationId xmlns:a16="http://schemas.microsoft.com/office/drawing/2014/main" id="{E7D5576C-FCDC-1A1B-0F17-979BE3501490}"/>
+              </a:ext>
+            </a:extLst>
+          </p:cNvPr>
+          <p:cNvSpPr txBox="1"/>
+          <p:nvPr/>
+        </p:nvSpPr>
+        <p:spPr>
+          <a:xfrm>
+            <a:off x="7818760" y="4737782"/>
+            <a:ext cx="2015474" cy="523220"/>
+          </a:xfrm>
+          <a:prstGeom prst="rect">
+            <a:avLst/>
+          </a:prstGeom>
+          <a:solidFill>
+            <a:schemeClr val="accent6">
+              <a:lumMod val="75000"/>
+            </a:schemeClr>
+          </a:solidFill>
+          <a:ln>
+            <a:solidFill>
+              <a:schemeClr val="tx2">
+                <a:lumMod val="25000"/>
+                <a:lumOff val="75000"/>
+              </a:schemeClr>
+            </a:solidFill>
+          </a:ln>
+        </p:spPr>
+        <p:txBody>
+          <a:bodyPr wrap="square">
+            <a:spAutoFit/>
+          </a:bodyPr>
+          <a:lstStyle/>
+          <a:p>
+            <a:r>
+              <a:rPr lang="en-US" sz="1400" b="1" dirty="0">
+                <a:solidFill>
+                  <a:schemeClr val="bg1"/>
+                </a:solidFill>
+              </a:rPr>
+              <a:t>Answer generated by DeepSeek-R1:7B</a:t>
+            </a:r>
+            <a:endParaRPr lang="en-SG" sz="1400" b="1" dirty="0">
+              <a:solidFill>
+                <a:schemeClr val="bg1"/>
+              </a:solidFill>
+            </a:endParaRPr>
+          </a:p>
+        </p:txBody>
+      </p:sp>
+      <p:sp>
+        <p:nvSpPr>
+          <p:cNvPr id="69" name="TextBox 68">
+            <a:extLst>
+              <a:ext uri="{FF2B5EF4-FFF2-40B4-BE49-F238E27FC236}">
+                <a16:creationId xmlns:a16="http://schemas.microsoft.com/office/drawing/2014/main" id="{2950193C-C655-50A6-6A14-23DDEB0ED1DA}"/>
+              </a:ext>
+            </a:extLst>
+          </p:cNvPr>
+          <p:cNvSpPr txBox="1"/>
+          <p:nvPr/>
+        </p:nvSpPr>
+        <p:spPr>
+          <a:xfrm>
+            <a:off x="7818760" y="5374138"/>
+            <a:ext cx="2076786" cy="523220"/>
+          </a:xfrm>
+          <a:prstGeom prst="rect">
+            <a:avLst/>
+          </a:prstGeom>
+          <a:solidFill>
+            <a:schemeClr val="accent2">
+              <a:lumMod val="75000"/>
+            </a:schemeClr>
+          </a:solidFill>
+          <a:ln>
+            <a:solidFill>
+              <a:schemeClr val="tx2">
+                <a:lumMod val="25000"/>
+                <a:lumOff val="75000"/>
+              </a:schemeClr>
+            </a:solidFill>
+          </a:ln>
+        </p:spPr>
+        <p:txBody>
+          <a:bodyPr wrap="square">
+            <a:spAutoFit/>
+          </a:bodyPr>
+          <a:lstStyle/>
+          <a:p>
+            <a:r>
+              <a:rPr lang="en-US" sz="1400" b="1" dirty="0">
+                <a:solidFill>
+                  <a:schemeClr val="bg1"/>
+                </a:solidFill>
+              </a:rPr>
+              <a:t>Answer generated by DeepSeek-R1:8B + RAG</a:t>
+            </a:r>
+            <a:endParaRPr lang="en-SG" sz="1400" b="1" dirty="0">
+              <a:solidFill>
+                <a:schemeClr val="bg1"/>
+              </a:solidFill>
+            </a:endParaRPr>
+          </a:p>
+        </p:txBody>
+      </p:sp>
+      <p:sp>
+        <p:nvSpPr>
+          <p:cNvPr id="70" name="TextBox 69">
+            <a:extLst>
+              <a:ext uri="{FF2B5EF4-FFF2-40B4-BE49-F238E27FC236}">
+                <a16:creationId xmlns:a16="http://schemas.microsoft.com/office/drawing/2014/main" id="{60B162FF-CB46-F0D4-785E-6B56525B7BE0}"/>
+              </a:ext>
+            </a:extLst>
+          </p:cNvPr>
+          <p:cNvSpPr txBox="1"/>
+          <p:nvPr/>
+        </p:nvSpPr>
+        <p:spPr>
+          <a:xfrm>
+            <a:off x="4897206" y="599625"/>
+            <a:ext cx="5126023" cy="830997"/>
+          </a:xfrm>
+          <a:prstGeom prst="rect">
+            <a:avLst/>
+          </a:prstGeom>
+          <a:noFill/>
+        </p:spPr>
+        <p:txBody>
+          <a:bodyPr wrap="square">
+            <a:spAutoFit/>
+          </a:bodyPr>
+          <a:lstStyle/>
+          <a:p>
+            <a:r>
+              <a:rPr lang="en-US" sz="1600" b="1" dirty="0"/>
+              <a:t>Use Case Scenario-03: </a:t>
+            </a:r>
+          </a:p>
+          <a:p>
+            <a:r>
+              <a:rPr lang="en-US" sz="1600" b="1" dirty="0"/>
+              <a:t>Link to multiple GPU’s LLM Models to collect different answers for same question and compare the result.</a:t>
+            </a:r>
+            <a:endParaRPr lang="en-SG" sz="1600" b="1" dirty="0"/>
+          </a:p>
+        </p:txBody>
+      </p:sp>
+      <p:sp>
+        <p:nvSpPr>
+          <p:cNvPr id="71" name="TextBox 70">
+            <a:extLst>
+              <a:ext uri="{FF2B5EF4-FFF2-40B4-BE49-F238E27FC236}">
+                <a16:creationId xmlns:a16="http://schemas.microsoft.com/office/drawing/2014/main" id="{024001E4-C270-BA7C-07E7-CB10BE0F29A4}"/>
+              </a:ext>
+            </a:extLst>
+          </p:cNvPr>
+          <p:cNvSpPr txBox="1"/>
+          <p:nvPr/>
+        </p:nvSpPr>
+        <p:spPr>
+          <a:xfrm>
+            <a:off x="8922419" y="1546805"/>
+            <a:ext cx="1164327" cy="584775"/>
+          </a:xfrm>
+          <a:prstGeom prst="rect">
+            <a:avLst/>
+          </a:prstGeom>
+          <a:noFill/>
+        </p:spPr>
+        <p:txBody>
+          <a:bodyPr wrap="square">
+            <a:spAutoFit/>
+          </a:bodyPr>
+          <a:lstStyle/>
+          <a:p>
+            <a:r>
+              <a:rPr lang="en-US" sz="1600" b="1" dirty="0">
+                <a:solidFill>
+                  <a:schemeClr val="bg1">
+                    <a:lumMod val="65000"/>
+                  </a:schemeClr>
+                </a:solidFill>
+              </a:rPr>
+              <a:t>Customer Subnet</a:t>
+            </a:r>
+            <a:endParaRPr lang="en-SG" sz="1600" b="1" dirty="0">
+              <a:solidFill>
+                <a:schemeClr val="bg1">
+                  <a:lumMod val="65000"/>
+                </a:schemeClr>
+              </a:solidFill>
+            </a:endParaRPr>
+          </a:p>
+        </p:txBody>
+      </p:sp>
+      <p:cxnSp>
+        <p:nvCxnSpPr>
+          <p:cNvPr id="72" name="Straight Connector 71">
+            <a:extLst>
+              <a:ext uri="{FF2B5EF4-FFF2-40B4-BE49-F238E27FC236}">
+                <a16:creationId xmlns:a16="http://schemas.microsoft.com/office/drawing/2014/main" id="{36E5BED7-8F59-C28C-59A1-C781F927A262}"/>
+              </a:ext>
+            </a:extLst>
+          </p:cNvPr>
+          <p:cNvCxnSpPr>
+            <a:cxnSpLocks/>
+          </p:cNvCxnSpPr>
+          <p:nvPr/>
+        </p:nvCxnSpPr>
+        <p:spPr>
+          <a:xfrm>
+            <a:off x="7516282" y="1801949"/>
+            <a:ext cx="0" cy="4516096"/>
+          </a:xfrm>
+          <a:prstGeom prst="line">
+            <a:avLst/>
+          </a:prstGeom>
+          <a:ln>
+            <a:solidFill>
+              <a:schemeClr val="bg1">
+                <a:lumMod val="65000"/>
+              </a:schemeClr>
+            </a:solidFill>
+            <a:prstDash val="sysDash"/>
+          </a:ln>
+        </p:spPr>
+        <p:style>
+          <a:lnRef idx="2">
+            <a:schemeClr val="accent1"/>
+          </a:lnRef>
+          <a:fillRef idx="0">
+            <a:schemeClr val="accent1"/>
+          </a:fillRef>
+          <a:effectRef idx="1">
+            <a:schemeClr val="accent1"/>
+          </a:effectRef>
+          <a:fontRef idx="minor">
+            <a:schemeClr val="tx1"/>
+          </a:fontRef>
+        </p:style>
+      </p:cxnSp>
+      <p:sp>
+        <p:nvSpPr>
+          <p:cNvPr id="73" name="TextBox 72">
+            <a:extLst>
+              <a:ext uri="{FF2B5EF4-FFF2-40B4-BE49-F238E27FC236}">
+                <a16:creationId xmlns:a16="http://schemas.microsoft.com/office/drawing/2014/main" id="{9C658E37-7C15-68B0-363A-FA1F7AFB016C}"/>
+              </a:ext>
+            </a:extLst>
+          </p:cNvPr>
+          <p:cNvSpPr txBox="1"/>
+          <p:nvPr/>
+        </p:nvSpPr>
+        <p:spPr>
+          <a:xfrm>
+            <a:off x="961414" y="5678699"/>
+            <a:ext cx="2764377" cy="338554"/>
+          </a:xfrm>
+          <a:prstGeom prst="rect">
+            <a:avLst/>
+          </a:prstGeom>
+          <a:noFill/>
+        </p:spPr>
+        <p:txBody>
+          <a:bodyPr wrap="square">
+            <a:spAutoFit/>
+          </a:bodyPr>
+          <a:lstStyle/>
+          <a:p>
+            <a:r>
+              <a:rPr lang="en-US" sz="1600" b="1" dirty="0">
+                <a:solidFill>
+                  <a:schemeClr val="bg1">
+                    <a:lumMod val="65000"/>
+                  </a:schemeClr>
+                </a:solidFill>
+              </a:rPr>
+              <a:t>GPU and server Subnet</a:t>
+            </a:r>
+            <a:endParaRPr lang="en-SG" sz="1600" b="1" dirty="0">
+              <a:solidFill>
+                <a:schemeClr val="bg1">
+                  <a:lumMod val="65000"/>
+                </a:schemeClr>
+              </a:solidFill>
+            </a:endParaRPr>
+          </a:p>
+        </p:txBody>
+      </p:sp>
+    </p:spTree>
+    <p:extLst>
+      <p:ext uri="{BB962C8B-B14F-4D97-AF65-F5344CB8AC3E}">
+        <p14:creationId xmlns:p14="http://schemas.microsoft.com/office/powerpoint/2010/main" val="1429975187"/>
       </p:ext>
     </p:extLst>
   </p:cSld>

</xml_diff>